<commit_message>
actualizar: actividad de la semana02
</commit_message>
<xml_diff>
--- a/A02/A02.pptx
+++ b/A02/A02.pptx
@@ -10,7 +10,12 @@
     <p:sldId id="257" r:id="rId4"/>
     <p:sldId id="262" r:id="rId5"/>
     <p:sldId id="258" r:id="rId6"/>
-    <p:sldId id="260" r:id="rId7"/>
+    <p:sldId id="267" r:id="rId7"/>
+    <p:sldId id="268" r:id="rId8"/>
+    <p:sldId id="265" r:id="rId9"/>
+    <p:sldId id="264" r:id="rId10"/>
+    <p:sldId id="266" r:id="rId11"/>
+    <p:sldId id="260" r:id="rId12"/>
   </p:sldIdLst>
   <p:sldSz cx="12192000" cy="6858000"/>
   <p:notesSz cx="6858000" cy="9144000"/>
@@ -458,7 +463,7 @@
           </a:lstStyle>
           <a:p>
             <a:r>
-              <a:rPr lang="es-ES" smtClean="0"/>
+              <a:rPr lang="es-ES"/>
               <a:t>Haga clic para modificar el estilo de título del patrón</a:t>
             </a:r>
             <a:endParaRPr lang="en-US" dirty="0"/>
@@ -531,7 +536,7 @@
           </a:lstStyle>
           <a:p>
             <a:r>
-              <a:rPr lang="es-ES" smtClean="0"/>
+              <a:rPr lang="es-ES"/>
               <a:t>Haga clic para editar el estilo de subtítulo del patrón</a:t>
             </a:r>
             <a:endParaRPr lang="en-US" dirty="0"/>
@@ -570,7 +575,7 @@
           <a:p>
             <a:fld id="{46D05528-C563-43E1-92D1-559F6131406B}" type="datetimeFigureOut">
               <a:rPr lang="es-PE" smtClean="0"/>
-              <a:t>6/09/2025</a:t>
+              <a:t>7/09/2025</a:t>
             </a:fld>
             <a:endParaRPr lang="es-PE"/>
           </a:p>
@@ -740,7 +745,7 @@
           </a:lstStyle>
           <a:p>
             <a:r>
-              <a:rPr lang="es-ES" smtClean="0"/>
+              <a:rPr lang="es-ES"/>
               <a:t>Haga clic para modificar el estilo de título del patrón</a:t>
             </a:r>
             <a:endParaRPr lang="en-US" dirty="0"/>
@@ -813,7 +818,7 @@
           </a:lstStyle>
           <a:p>
             <a:r>
-              <a:rPr lang="es-ES" smtClean="0"/>
+              <a:rPr lang="es-ES"/>
               <a:t>Haga clic en el icono para agregar una imagen</a:t>
             </a:r>
             <a:endParaRPr lang="en-US" dirty="0"/>
@@ -879,7 +884,7 @@
           <a:p>
             <a:pPr lvl="0"/>
             <a:r>
-              <a:rPr lang="es-ES" smtClean="0"/>
+              <a:rPr lang="es-ES"/>
               <a:t>Editar el estilo de texto del patrón</a:t>
             </a:r>
           </a:p>
@@ -902,7 +907,7 @@
           <a:p>
             <a:fld id="{46D05528-C563-43E1-92D1-559F6131406B}" type="datetimeFigureOut">
               <a:rPr lang="es-PE" smtClean="0"/>
-              <a:t>6/09/2025</a:t>
+              <a:t>7/09/2025</a:t>
             </a:fld>
             <a:endParaRPr lang="es-PE"/>
           </a:p>
@@ -1007,7 +1012,7 @@
           </a:lstStyle>
           <a:p>
             <a:r>
-              <a:rPr lang="es-ES" smtClean="0"/>
+              <a:rPr lang="es-ES"/>
               <a:t>Haga clic para modificar el estilo de título del patrón</a:t>
             </a:r>
             <a:endParaRPr lang="en-US" dirty="0"/>
@@ -1075,7 +1080,7 @@
           <a:p>
             <a:pPr lvl="0"/>
             <a:r>
-              <a:rPr lang="es-ES" smtClean="0"/>
+              <a:rPr lang="es-ES"/>
               <a:t>Editar el estilo de texto del patrón</a:t>
             </a:r>
           </a:p>
@@ -1098,7 +1103,7 @@
           <a:p>
             <a:fld id="{46D05528-C563-43E1-92D1-559F6131406B}" type="datetimeFigureOut">
               <a:rPr lang="es-PE" smtClean="0"/>
-              <a:t>6/09/2025</a:t>
+              <a:t>7/09/2025</a:t>
             </a:fld>
             <a:endParaRPr lang="es-PE"/>
           </a:p>
@@ -1203,7 +1208,7 @@
           </a:lstStyle>
           <a:p>
             <a:r>
-              <a:rPr lang="es-ES" smtClean="0"/>
+              <a:rPr lang="es-ES"/>
               <a:t>Haga clic para modificar el estilo de título del patrón</a:t>
             </a:r>
             <a:endParaRPr lang="en-US" dirty="0"/>
@@ -1278,7 +1283,7 @@
           <a:p>
             <a:pPr lvl="0"/>
             <a:r>
-              <a:rPr lang="es-ES" smtClean="0"/>
+              <a:rPr lang="es-ES"/>
               <a:t>Editar el estilo de texto del patrón</a:t>
             </a:r>
           </a:p>
@@ -1345,7 +1350,7 @@
           <a:p>
             <a:pPr lvl="0"/>
             <a:r>
-              <a:rPr lang="es-ES" smtClean="0"/>
+              <a:rPr lang="es-ES"/>
               <a:t>Editar el estilo de texto del patrón</a:t>
             </a:r>
           </a:p>
@@ -1368,7 +1373,7 @@
           <a:p>
             <a:fld id="{46D05528-C563-43E1-92D1-559F6131406B}" type="datetimeFigureOut">
               <a:rPr lang="es-PE" smtClean="0"/>
-              <a:t>6/09/2025</a:t>
+              <a:t>7/09/2025</a:t>
             </a:fld>
             <a:endParaRPr lang="es-PE"/>
           </a:p>
@@ -1705,7 +1710,7 @@
           </a:lstStyle>
           <a:p>
             <a:r>
-              <a:rPr lang="es-ES" smtClean="0"/>
+              <a:rPr lang="es-ES"/>
               <a:t>Haga clic para modificar el estilo de título del patrón</a:t>
             </a:r>
             <a:endParaRPr lang="en-US" dirty="0"/>
@@ -1773,7 +1778,7 @@
           <a:p>
             <a:pPr lvl="0"/>
             <a:r>
-              <a:rPr lang="es-ES" smtClean="0"/>
+              <a:rPr lang="es-ES"/>
               <a:t>Editar el estilo de texto del patrón</a:t>
             </a:r>
           </a:p>
@@ -1796,7 +1801,7 @@
           <a:p>
             <a:fld id="{46D05528-C563-43E1-92D1-559F6131406B}" type="datetimeFigureOut">
               <a:rPr lang="es-PE" smtClean="0"/>
-              <a:t>6/09/2025</a:t>
+              <a:t>7/09/2025</a:t>
             </a:fld>
             <a:endParaRPr lang="es-PE"/>
           </a:p>
@@ -1899,7 +1904,7 @@
           </a:lstStyle>
           <a:p>
             <a:r>
-              <a:rPr lang="es-ES" smtClean="0"/>
+              <a:rPr lang="es-ES"/>
               <a:t>Haga clic para modificar el estilo de título del patrón</a:t>
             </a:r>
             <a:endParaRPr lang="en-US" dirty="0"/>
@@ -1974,7 +1979,7 @@
           <a:p>
             <a:pPr lvl="0"/>
             <a:r>
-              <a:rPr lang="es-ES" smtClean="0"/>
+              <a:rPr lang="es-ES"/>
               <a:t>Editar el estilo de texto del patrón</a:t>
             </a:r>
           </a:p>
@@ -2041,7 +2046,7 @@
           <a:p>
             <a:pPr lvl="0"/>
             <a:r>
-              <a:rPr lang="es-ES" smtClean="0"/>
+              <a:rPr lang="es-ES"/>
               <a:t>Editar el estilo de texto del patrón</a:t>
             </a:r>
           </a:p>
@@ -2115,7 +2120,7 @@
           <a:p>
             <a:pPr lvl="0"/>
             <a:r>
-              <a:rPr lang="es-ES" smtClean="0"/>
+              <a:rPr lang="es-ES"/>
               <a:t>Editar el estilo de texto del patrón</a:t>
             </a:r>
           </a:p>
@@ -2182,7 +2187,7 @@
           <a:p>
             <a:pPr lvl="0"/>
             <a:r>
-              <a:rPr lang="es-ES" smtClean="0"/>
+              <a:rPr lang="es-ES"/>
               <a:t>Editar el estilo de texto del patrón</a:t>
             </a:r>
           </a:p>
@@ -2256,7 +2261,7 @@
           <a:p>
             <a:pPr lvl="0"/>
             <a:r>
-              <a:rPr lang="es-ES" smtClean="0"/>
+              <a:rPr lang="es-ES"/>
               <a:t>Editar el estilo de texto del patrón</a:t>
             </a:r>
           </a:p>
@@ -2323,7 +2328,7 @@
           <a:p>
             <a:pPr lvl="0"/>
             <a:r>
-              <a:rPr lang="es-ES" smtClean="0"/>
+              <a:rPr lang="es-ES"/>
               <a:t>Editar el estilo de texto del patrón</a:t>
             </a:r>
           </a:p>
@@ -2346,7 +2351,7 @@
           <a:p>
             <a:fld id="{46D05528-C563-43E1-92D1-559F6131406B}" type="datetimeFigureOut">
               <a:rPr lang="es-PE" smtClean="0"/>
-              <a:t>6/09/2025</a:t>
+              <a:t>7/09/2025</a:t>
             </a:fld>
             <a:endParaRPr lang="es-PE"/>
           </a:p>
@@ -2449,7 +2454,7 @@
           </a:lstStyle>
           <a:p>
             <a:r>
-              <a:rPr lang="es-ES" smtClean="0"/>
+              <a:rPr lang="es-ES"/>
               <a:t>Haga clic para modificar el estilo de título del patrón</a:t>
             </a:r>
             <a:endParaRPr lang="en-US" dirty="0"/>
@@ -2524,7 +2529,7 @@
           <a:p>
             <a:pPr lvl="0"/>
             <a:r>
-              <a:rPr lang="es-ES" smtClean="0"/>
+              <a:rPr lang="es-ES"/>
               <a:t>Editar el estilo de texto del patrón</a:t>
             </a:r>
           </a:p>
@@ -2603,7 +2608,7 @@
           </a:lstStyle>
           <a:p>
             <a:r>
-              <a:rPr lang="es-ES" smtClean="0"/>
+              <a:rPr lang="es-ES"/>
               <a:t>Haga clic en el icono para agregar una imagen</a:t>
             </a:r>
             <a:endParaRPr lang="en-US" dirty="0"/>
@@ -2671,7 +2676,7 @@
           <a:p>
             <a:pPr lvl="0"/>
             <a:r>
-              <a:rPr lang="es-ES" smtClean="0"/>
+              <a:rPr lang="es-ES"/>
               <a:t>Editar el estilo de texto del patrón</a:t>
             </a:r>
           </a:p>
@@ -2745,7 +2750,7 @@
           <a:p>
             <a:pPr lvl="0"/>
             <a:r>
-              <a:rPr lang="es-ES" smtClean="0"/>
+              <a:rPr lang="es-ES"/>
               <a:t>Editar el estilo de texto del patrón</a:t>
             </a:r>
           </a:p>
@@ -2824,7 +2829,7 @@
           </a:lstStyle>
           <a:p>
             <a:r>
-              <a:rPr lang="es-ES" smtClean="0"/>
+              <a:rPr lang="es-ES"/>
               <a:t>Haga clic en el icono para agregar una imagen</a:t>
             </a:r>
             <a:endParaRPr lang="en-US" dirty="0"/>
@@ -2892,7 +2897,7 @@
           <a:p>
             <a:pPr lvl="0"/>
             <a:r>
-              <a:rPr lang="es-ES" smtClean="0"/>
+              <a:rPr lang="es-ES"/>
               <a:t>Editar el estilo de texto del patrón</a:t>
             </a:r>
           </a:p>
@@ -2966,7 +2971,7 @@
           <a:p>
             <a:pPr lvl="0"/>
             <a:r>
-              <a:rPr lang="es-ES" smtClean="0"/>
+              <a:rPr lang="es-ES"/>
               <a:t>Editar el estilo de texto del patrón</a:t>
             </a:r>
           </a:p>
@@ -3045,7 +3050,7 @@
           </a:lstStyle>
           <a:p>
             <a:r>
-              <a:rPr lang="es-ES" smtClean="0"/>
+              <a:rPr lang="es-ES"/>
               <a:t>Haga clic en el icono para agregar una imagen</a:t>
             </a:r>
             <a:endParaRPr lang="en-US" dirty="0"/>
@@ -3113,7 +3118,7 @@
           <a:p>
             <a:pPr lvl="0"/>
             <a:r>
-              <a:rPr lang="es-ES" smtClean="0"/>
+              <a:rPr lang="es-ES"/>
               <a:t>Editar el estilo de texto del patrón</a:t>
             </a:r>
           </a:p>
@@ -3136,7 +3141,7 @@
           <a:p>
             <a:fld id="{46D05528-C563-43E1-92D1-559F6131406B}" type="datetimeFigureOut">
               <a:rPr lang="es-PE" smtClean="0"/>
-              <a:t>6/09/2025</a:t>
+              <a:t>7/09/2025</a:t>
             </a:fld>
             <a:endParaRPr lang="es-PE"/>
           </a:p>
@@ -3234,7 +3239,7 @@
           </a:lstStyle>
           <a:p>
             <a:r>
-              <a:rPr lang="es-ES" smtClean="0"/>
+              <a:rPr lang="es-ES"/>
               <a:t>Haga clic para modificar el estilo de título del patrón</a:t>
             </a:r>
             <a:endParaRPr lang="en-US" dirty="0"/>
@@ -3263,35 +3268,35 @@
           <a:p>
             <a:pPr lvl="0"/>
             <a:r>
-              <a:rPr lang="es-ES" smtClean="0"/>
+              <a:rPr lang="es-ES"/>
               <a:t>Editar el estilo de texto del patrón</a:t>
             </a:r>
           </a:p>
           <a:p>
             <a:pPr lvl="1"/>
             <a:r>
-              <a:rPr lang="es-ES" smtClean="0"/>
+              <a:rPr lang="es-ES"/>
               <a:t>Segundo nivel</a:t>
             </a:r>
           </a:p>
           <a:p>
             <a:pPr lvl="2"/>
             <a:r>
-              <a:rPr lang="es-ES" smtClean="0"/>
+              <a:rPr lang="es-ES"/>
               <a:t>Tercer nivel</a:t>
             </a:r>
           </a:p>
           <a:p>
             <a:pPr lvl="3"/>
             <a:r>
-              <a:rPr lang="es-ES" smtClean="0"/>
+              <a:rPr lang="es-ES"/>
               <a:t>Cuarto nivel</a:t>
             </a:r>
           </a:p>
           <a:p>
             <a:pPr lvl="4"/>
             <a:r>
-              <a:rPr lang="es-ES" smtClean="0"/>
+              <a:rPr lang="es-ES"/>
               <a:t>Quinto nivel</a:t>
             </a:r>
             <a:endParaRPr lang="en-US" dirty="0"/>
@@ -3315,7 +3320,7 @@
           <a:p>
             <a:fld id="{46D05528-C563-43E1-92D1-559F6131406B}" type="datetimeFigureOut">
               <a:rPr lang="es-PE" smtClean="0"/>
-              <a:t>6/09/2025</a:t>
+              <a:t>7/09/2025</a:t>
             </a:fld>
             <a:endParaRPr lang="es-PE"/>
           </a:p>
@@ -3418,7 +3423,7 @@
           </a:lstStyle>
           <a:p>
             <a:r>
-              <a:rPr lang="es-ES" smtClean="0"/>
+              <a:rPr lang="es-ES"/>
               <a:t>Haga clic para modificar el estilo de título del patrón</a:t>
             </a:r>
             <a:endParaRPr lang="en-US" dirty="0"/>
@@ -3447,35 +3452,35 @@
           <a:p>
             <a:pPr lvl="0"/>
             <a:r>
-              <a:rPr lang="es-ES" smtClean="0"/>
+              <a:rPr lang="es-ES"/>
               <a:t>Editar el estilo de texto del patrón</a:t>
             </a:r>
           </a:p>
           <a:p>
             <a:pPr lvl="1"/>
             <a:r>
-              <a:rPr lang="es-ES" smtClean="0"/>
+              <a:rPr lang="es-ES"/>
               <a:t>Segundo nivel</a:t>
             </a:r>
           </a:p>
           <a:p>
             <a:pPr lvl="2"/>
             <a:r>
-              <a:rPr lang="es-ES" smtClean="0"/>
+              <a:rPr lang="es-ES"/>
               <a:t>Tercer nivel</a:t>
             </a:r>
           </a:p>
           <a:p>
             <a:pPr lvl="3"/>
             <a:r>
-              <a:rPr lang="es-ES" smtClean="0"/>
+              <a:rPr lang="es-ES"/>
               <a:t>Cuarto nivel</a:t>
             </a:r>
           </a:p>
           <a:p>
             <a:pPr lvl="4"/>
             <a:r>
-              <a:rPr lang="es-ES" smtClean="0"/>
+              <a:rPr lang="es-ES"/>
               <a:t>Quinto nivel</a:t>
             </a:r>
             <a:endParaRPr lang="en-US" dirty="0"/>
@@ -3499,7 +3504,7 @@
           <a:p>
             <a:fld id="{46D05528-C563-43E1-92D1-559F6131406B}" type="datetimeFigureOut">
               <a:rPr lang="es-PE" smtClean="0"/>
-              <a:t>6/09/2025</a:t>
+              <a:t>7/09/2025</a:t>
             </a:fld>
             <a:endParaRPr lang="es-PE"/>
           </a:p>
@@ -3593,7 +3598,7 @@
           <a:lstStyle/>
           <a:p>
             <a:r>
-              <a:rPr lang="es-ES" smtClean="0"/>
+              <a:rPr lang="es-ES"/>
               <a:t>Haga clic para modificar el estilo de título del patrón</a:t>
             </a:r>
             <a:endParaRPr lang="en-US" dirty="0"/>
@@ -3622,35 +3627,35 @@
           <a:p>
             <a:pPr lvl="0"/>
             <a:r>
-              <a:rPr lang="es-ES" smtClean="0"/>
+              <a:rPr lang="es-ES"/>
               <a:t>Editar el estilo de texto del patrón</a:t>
             </a:r>
           </a:p>
           <a:p>
             <a:pPr lvl="1"/>
             <a:r>
-              <a:rPr lang="es-ES" smtClean="0"/>
+              <a:rPr lang="es-ES"/>
               <a:t>Segundo nivel</a:t>
             </a:r>
           </a:p>
           <a:p>
             <a:pPr lvl="2"/>
             <a:r>
-              <a:rPr lang="es-ES" smtClean="0"/>
+              <a:rPr lang="es-ES"/>
               <a:t>Tercer nivel</a:t>
             </a:r>
           </a:p>
           <a:p>
             <a:pPr lvl="3"/>
             <a:r>
-              <a:rPr lang="es-ES" smtClean="0"/>
+              <a:rPr lang="es-ES"/>
               <a:t>Cuarto nivel</a:t>
             </a:r>
           </a:p>
           <a:p>
             <a:pPr lvl="4"/>
             <a:r>
-              <a:rPr lang="es-ES" smtClean="0"/>
+              <a:rPr lang="es-ES"/>
               <a:t>Quinto nivel</a:t>
             </a:r>
             <a:endParaRPr lang="en-US" dirty="0"/>
@@ -3674,7 +3679,7 @@
           <a:p>
             <a:fld id="{46D05528-C563-43E1-92D1-559F6131406B}" type="datetimeFigureOut">
               <a:rPr lang="es-PE" smtClean="0"/>
-              <a:t>6/09/2025</a:t>
+              <a:t>7/09/2025</a:t>
             </a:fld>
             <a:endParaRPr lang="es-PE"/>
           </a:p>
@@ -3779,7 +3784,7 @@
           </a:lstStyle>
           <a:p>
             <a:r>
-              <a:rPr lang="es-ES" smtClean="0"/>
+              <a:rPr lang="es-ES"/>
               <a:t>Haga clic para modificar el estilo de título del patrón</a:t>
             </a:r>
             <a:endParaRPr lang="en-US" dirty="0"/>
@@ -3901,7 +3906,7 @@
           <a:p>
             <a:pPr lvl="0"/>
             <a:r>
-              <a:rPr lang="es-ES" smtClean="0"/>
+              <a:rPr lang="es-ES"/>
               <a:t>Editar el estilo de texto del patrón</a:t>
             </a:r>
           </a:p>
@@ -3924,7 +3929,7 @@
           <a:p>
             <a:fld id="{46D05528-C563-43E1-92D1-559F6131406B}" type="datetimeFigureOut">
               <a:rPr lang="es-PE" smtClean="0"/>
-              <a:t>6/09/2025</a:t>
+              <a:t>7/09/2025</a:t>
             </a:fld>
             <a:endParaRPr lang="es-PE"/>
           </a:p>
@@ -4023,7 +4028,7 @@
           <a:lstStyle/>
           <a:p>
             <a:r>
-              <a:rPr lang="es-ES" smtClean="0"/>
+              <a:rPr lang="es-ES"/>
               <a:t>Haga clic para modificar el estilo de título del patrón</a:t>
             </a:r>
             <a:endParaRPr lang="en-US" dirty="0"/>
@@ -4052,35 +4057,35 @@
           <a:p>
             <a:pPr lvl="0"/>
             <a:r>
-              <a:rPr lang="es-ES" smtClean="0"/>
+              <a:rPr lang="es-ES"/>
               <a:t>Editar el estilo de texto del patrón</a:t>
             </a:r>
           </a:p>
           <a:p>
             <a:pPr lvl="1"/>
             <a:r>
-              <a:rPr lang="es-ES" smtClean="0"/>
+              <a:rPr lang="es-ES"/>
               <a:t>Segundo nivel</a:t>
             </a:r>
           </a:p>
           <a:p>
             <a:pPr lvl="2"/>
             <a:r>
-              <a:rPr lang="es-ES" smtClean="0"/>
+              <a:rPr lang="es-ES"/>
               <a:t>Tercer nivel</a:t>
             </a:r>
           </a:p>
           <a:p>
             <a:pPr lvl="3"/>
             <a:r>
-              <a:rPr lang="es-ES" smtClean="0"/>
+              <a:rPr lang="es-ES"/>
               <a:t>Cuarto nivel</a:t>
             </a:r>
           </a:p>
           <a:p>
             <a:pPr lvl="4"/>
             <a:r>
-              <a:rPr lang="es-ES" smtClean="0"/>
+              <a:rPr lang="es-ES"/>
               <a:t>Quinto nivel</a:t>
             </a:r>
             <a:endParaRPr lang="en-US" dirty="0"/>
@@ -4109,35 +4114,35 @@
           <a:p>
             <a:pPr lvl="0"/>
             <a:r>
-              <a:rPr lang="es-ES" smtClean="0"/>
+              <a:rPr lang="es-ES"/>
               <a:t>Editar el estilo de texto del patrón</a:t>
             </a:r>
           </a:p>
           <a:p>
             <a:pPr lvl="1"/>
             <a:r>
-              <a:rPr lang="es-ES" smtClean="0"/>
+              <a:rPr lang="es-ES"/>
               <a:t>Segundo nivel</a:t>
             </a:r>
           </a:p>
           <a:p>
             <a:pPr lvl="2"/>
             <a:r>
-              <a:rPr lang="es-ES" smtClean="0"/>
+              <a:rPr lang="es-ES"/>
               <a:t>Tercer nivel</a:t>
             </a:r>
           </a:p>
           <a:p>
             <a:pPr lvl="3"/>
             <a:r>
-              <a:rPr lang="es-ES" smtClean="0"/>
+              <a:rPr lang="es-ES"/>
               <a:t>Cuarto nivel</a:t>
             </a:r>
           </a:p>
           <a:p>
             <a:pPr lvl="4"/>
             <a:r>
-              <a:rPr lang="es-ES" smtClean="0"/>
+              <a:rPr lang="es-ES"/>
               <a:t>Quinto nivel</a:t>
             </a:r>
             <a:endParaRPr lang="en-US" dirty="0"/>
@@ -4161,7 +4166,7 @@
           <a:p>
             <a:fld id="{46D05528-C563-43E1-92D1-559F6131406B}" type="datetimeFigureOut">
               <a:rPr lang="es-PE" smtClean="0"/>
-              <a:t>6/09/2025</a:t>
+              <a:t>7/09/2025</a:t>
             </a:fld>
             <a:endParaRPr lang="es-PE"/>
           </a:p>
@@ -4260,7 +4265,7 @@
           <a:lstStyle/>
           <a:p>
             <a:r>
-              <a:rPr lang="es-ES" smtClean="0"/>
+              <a:rPr lang="es-ES"/>
               <a:t>Haga clic para modificar el estilo de título del patrón</a:t>
             </a:r>
             <a:endParaRPr lang="en-US" dirty="0"/>
@@ -4335,7 +4340,7 @@
           <a:p>
             <a:pPr lvl="0"/>
             <a:r>
-              <a:rPr lang="es-ES" smtClean="0"/>
+              <a:rPr lang="es-ES"/>
               <a:t>Editar el estilo de texto del patrón</a:t>
             </a:r>
           </a:p>
@@ -4363,35 +4368,35 @@
           <a:p>
             <a:pPr lvl="0"/>
             <a:r>
-              <a:rPr lang="es-ES" smtClean="0"/>
+              <a:rPr lang="es-ES"/>
               <a:t>Editar el estilo de texto del patrón</a:t>
             </a:r>
           </a:p>
           <a:p>
             <a:pPr lvl="1"/>
             <a:r>
-              <a:rPr lang="es-ES" smtClean="0"/>
+              <a:rPr lang="es-ES"/>
               <a:t>Segundo nivel</a:t>
             </a:r>
           </a:p>
           <a:p>
             <a:pPr lvl="2"/>
             <a:r>
-              <a:rPr lang="es-ES" smtClean="0"/>
+              <a:rPr lang="es-ES"/>
               <a:t>Tercer nivel</a:t>
             </a:r>
           </a:p>
           <a:p>
             <a:pPr lvl="3"/>
             <a:r>
-              <a:rPr lang="es-ES" smtClean="0"/>
+              <a:rPr lang="es-ES"/>
               <a:t>Cuarto nivel</a:t>
             </a:r>
           </a:p>
           <a:p>
             <a:pPr lvl="4"/>
             <a:r>
-              <a:rPr lang="es-ES" smtClean="0"/>
+              <a:rPr lang="es-ES"/>
               <a:t>Quinto nivel</a:t>
             </a:r>
             <a:endParaRPr lang="en-US" dirty="0"/>
@@ -4466,7 +4471,7 @@
           <a:p>
             <a:pPr lvl="0"/>
             <a:r>
-              <a:rPr lang="es-ES" smtClean="0"/>
+              <a:rPr lang="es-ES"/>
               <a:t>Editar el estilo de texto del patrón</a:t>
             </a:r>
           </a:p>
@@ -4494,35 +4499,35 @@
           <a:p>
             <a:pPr lvl="0"/>
             <a:r>
-              <a:rPr lang="es-ES" smtClean="0"/>
+              <a:rPr lang="es-ES"/>
               <a:t>Editar el estilo de texto del patrón</a:t>
             </a:r>
           </a:p>
           <a:p>
             <a:pPr lvl="1"/>
             <a:r>
-              <a:rPr lang="es-ES" smtClean="0"/>
+              <a:rPr lang="es-ES"/>
               <a:t>Segundo nivel</a:t>
             </a:r>
           </a:p>
           <a:p>
             <a:pPr lvl="2"/>
             <a:r>
-              <a:rPr lang="es-ES" smtClean="0"/>
+              <a:rPr lang="es-ES"/>
               <a:t>Tercer nivel</a:t>
             </a:r>
           </a:p>
           <a:p>
             <a:pPr lvl="3"/>
             <a:r>
-              <a:rPr lang="es-ES" smtClean="0"/>
+              <a:rPr lang="es-ES"/>
               <a:t>Cuarto nivel</a:t>
             </a:r>
           </a:p>
           <a:p>
             <a:pPr lvl="4"/>
             <a:r>
-              <a:rPr lang="es-ES" smtClean="0"/>
+              <a:rPr lang="es-ES"/>
               <a:t>Quinto nivel</a:t>
             </a:r>
             <a:endParaRPr lang="en-US" dirty="0"/>
@@ -4546,7 +4551,7 @@
           <a:p>
             <a:fld id="{46D05528-C563-43E1-92D1-559F6131406B}" type="datetimeFigureOut">
               <a:rPr lang="es-PE" smtClean="0"/>
-              <a:t>6/09/2025</a:t>
+              <a:t>7/09/2025</a:t>
             </a:fld>
             <a:endParaRPr lang="es-PE"/>
           </a:p>
@@ -4640,7 +4645,7 @@
           <a:lstStyle/>
           <a:p>
             <a:r>
-              <a:rPr lang="es-ES" smtClean="0"/>
+              <a:rPr lang="es-ES"/>
               <a:t>Haga clic para modificar el estilo de título del patrón</a:t>
             </a:r>
             <a:endParaRPr lang="en-US" dirty="0"/>
@@ -4664,7 +4669,7 @@
           <a:p>
             <a:fld id="{46D05528-C563-43E1-92D1-559F6131406B}" type="datetimeFigureOut">
               <a:rPr lang="es-PE" smtClean="0"/>
-              <a:t>6/09/2025</a:t>
+              <a:t>7/09/2025</a:t>
             </a:fld>
             <a:endParaRPr lang="es-PE"/>
           </a:p>
@@ -4759,7 +4764,7 @@
           <a:p>
             <a:fld id="{46D05528-C563-43E1-92D1-559F6131406B}" type="datetimeFigureOut">
               <a:rPr lang="es-PE" smtClean="0"/>
-              <a:t>6/09/2025</a:t>
+              <a:t>7/09/2025</a:t>
             </a:fld>
             <a:endParaRPr lang="es-PE"/>
           </a:p>
@@ -4864,7 +4869,7 @@
           </a:lstStyle>
           <a:p>
             <a:r>
-              <a:rPr lang="es-ES" smtClean="0"/>
+              <a:rPr lang="es-ES"/>
               <a:t>Haga clic para modificar el estilo de título del patrón</a:t>
             </a:r>
             <a:endParaRPr lang="en-US" dirty="0"/>
@@ -4893,35 +4898,35 @@
           <a:p>
             <a:pPr lvl="0"/>
             <a:r>
-              <a:rPr lang="es-ES" smtClean="0"/>
+              <a:rPr lang="es-ES"/>
               <a:t>Editar el estilo de texto del patrón</a:t>
             </a:r>
           </a:p>
           <a:p>
             <a:pPr lvl="1"/>
             <a:r>
-              <a:rPr lang="es-ES" smtClean="0"/>
+              <a:rPr lang="es-ES"/>
               <a:t>Segundo nivel</a:t>
             </a:r>
           </a:p>
           <a:p>
             <a:pPr lvl="2"/>
             <a:r>
-              <a:rPr lang="es-ES" smtClean="0"/>
+              <a:rPr lang="es-ES"/>
               <a:t>Tercer nivel</a:t>
             </a:r>
           </a:p>
           <a:p>
             <a:pPr lvl="3"/>
             <a:r>
-              <a:rPr lang="es-ES" smtClean="0"/>
+              <a:rPr lang="es-ES"/>
               <a:t>Cuarto nivel</a:t>
             </a:r>
           </a:p>
           <a:p>
             <a:pPr lvl="4"/>
             <a:r>
-              <a:rPr lang="es-ES" smtClean="0"/>
+              <a:rPr lang="es-ES"/>
               <a:t>Quinto nivel</a:t>
             </a:r>
             <a:endParaRPr lang="en-US" dirty="0"/>
@@ -4989,7 +4994,7 @@
           <a:p>
             <a:pPr lvl="0"/>
             <a:r>
-              <a:rPr lang="es-ES" smtClean="0"/>
+              <a:rPr lang="es-ES"/>
               <a:t>Editar el estilo de texto del patrón</a:t>
             </a:r>
           </a:p>
@@ -5012,7 +5017,7 @@
           <a:p>
             <a:fld id="{46D05528-C563-43E1-92D1-559F6131406B}" type="datetimeFigureOut">
               <a:rPr lang="es-PE" smtClean="0"/>
-              <a:t>6/09/2025</a:t>
+              <a:t>7/09/2025</a:t>
             </a:fld>
             <a:endParaRPr lang="es-PE"/>
           </a:p>
@@ -5117,7 +5122,7 @@
           </a:lstStyle>
           <a:p>
             <a:r>
-              <a:rPr lang="es-ES" smtClean="0"/>
+              <a:rPr lang="es-ES"/>
               <a:t>Haga clic para modificar el estilo de título del patrón</a:t>
             </a:r>
             <a:endParaRPr lang="en-US" dirty="0"/>
@@ -5190,7 +5195,7 @@
           </a:lstStyle>
           <a:p>
             <a:r>
-              <a:rPr lang="es-ES" smtClean="0"/>
+              <a:rPr lang="es-ES"/>
               <a:t>Haga clic en el icono para agregar una imagen</a:t>
             </a:r>
             <a:endParaRPr lang="en-US" dirty="0"/>
@@ -5258,7 +5263,7 @@
           <a:p>
             <a:pPr lvl="0"/>
             <a:r>
-              <a:rPr lang="es-ES" smtClean="0"/>
+              <a:rPr lang="es-ES"/>
               <a:t>Editar el estilo de texto del patrón</a:t>
             </a:r>
           </a:p>
@@ -5281,7 +5286,7 @@
           <a:p>
             <a:fld id="{46D05528-C563-43E1-92D1-559F6131406B}" type="datetimeFigureOut">
               <a:rPr lang="es-PE" smtClean="0"/>
-              <a:t>6/09/2025</a:t>
+              <a:t>7/09/2025</a:t>
             </a:fld>
             <a:endParaRPr lang="es-PE"/>
           </a:p>
@@ -5580,7 +5585,7 @@
           <a:lstStyle/>
           <a:p>
             <a:r>
-              <a:rPr lang="es-ES" smtClean="0"/>
+              <a:rPr lang="es-ES"/>
               <a:t>Haga clic para modificar el estilo de título del patrón</a:t>
             </a:r>
             <a:endParaRPr lang="en-US" dirty="0"/>
@@ -5614,35 +5619,35 @@
           <a:p>
             <a:pPr lvl="0"/>
             <a:r>
-              <a:rPr lang="es-ES" smtClean="0"/>
+              <a:rPr lang="es-ES"/>
               <a:t>Editar el estilo de texto del patrón</a:t>
             </a:r>
           </a:p>
           <a:p>
             <a:pPr lvl="1"/>
             <a:r>
-              <a:rPr lang="es-ES" smtClean="0"/>
+              <a:rPr lang="es-ES"/>
               <a:t>Segundo nivel</a:t>
             </a:r>
           </a:p>
           <a:p>
             <a:pPr lvl="2"/>
             <a:r>
-              <a:rPr lang="es-ES" smtClean="0"/>
+              <a:rPr lang="es-ES"/>
               <a:t>Tercer nivel</a:t>
             </a:r>
           </a:p>
           <a:p>
             <a:pPr lvl="3"/>
             <a:r>
-              <a:rPr lang="es-ES" smtClean="0"/>
+              <a:rPr lang="es-ES"/>
               <a:t>Cuarto nivel</a:t>
             </a:r>
           </a:p>
           <a:p>
             <a:pPr lvl="4"/>
             <a:r>
-              <a:rPr lang="es-ES" smtClean="0"/>
+              <a:rPr lang="es-ES"/>
               <a:t>Quinto nivel</a:t>
             </a:r>
             <a:endParaRPr lang="en-US" dirty="0"/>
@@ -5684,7 +5689,7 @@
           <a:p>
             <a:fld id="{46D05528-C563-43E1-92D1-559F6131406B}" type="datetimeFigureOut">
               <a:rPr lang="es-PE" smtClean="0"/>
-              <a:t>6/09/2025</a:t>
+              <a:t>7/09/2025</a:t>
             </a:fld>
             <a:endParaRPr lang="es-PE"/>
           </a:p>
@@ -6157,7 +6162,7 @@
           <a:lstStyle/>
           <a:p>
             <a:r>
-              <a:rPr lang="es-MX" b="1" dirty="0" smtClean="0"/>
+              <a:rPr lang="es-MX" b="1" dirty="0"/>
               <a:t>Análisis de data en Seguridad Ciudadana</a:t>
             </a:r>
             <a:endParaRPr lang="es-PE" b="1" dirty="0"/>
@@ -6180,7 +6185,7 @@
           <a:lstStyle/>
           <a:p>
             <a:r>
-              <a:rPr lang="es-MX" dirty="0" smtClean="0"/>
+              <a:rPr lang="es-MX" dirty="0"/>
               <a:t>BIG DATA Y LA RED global</a:t>
             </a:r>
             <a:endParaRPr lang="es-PE" dirty="0"/>
@@ -6282,6 +6287,201 @@
 </p:sld>
 </file>
 
+<file path=ppt/slides/slide10.xml><?xml version="1.0" encoding="utf-8"?>
+<p:sld xmlns:a="http://schemas.openxmlformats.org/drawingml/2006/main" xmlns:r="http://schemas.openxmlformats.org/officeDocument/2006/relationships" xmlns:p="http://schemas.openxmlformats.org/presentationml/2006/main">
+  <p:cSld>
+    <p:spTree>
+      <p:nvGrpSpPr>
+        <p:cNvPr id="1" name=""/>
+        <p:cNvGrpSpPr/>
+        <p:nvPr/>
+      </p:nvGrpSpPr>
+      <p:grpSpPr>
+        <a:xfrm>
+          <a:off x="0" y="0"/>
+          <a:ext cx="0" cy="0"/>
+          <a:chOff x="0" y="0"/>
+          <a:chExt cx="0" cy="0"/>
+        </a:xfrm>
+      </p:grpSpPr>
+      <p:sp>
+        <p:nvSpPr>
+          <p:cNvPr id="2" name="Título 1">
+            <a:extLst>
+              <a:ext uri="{FF2B5EF4-FFF2-40B4-BE49-F238E27FC236}">
+                <a16:creationId xmlns:a16="http://schemas.microsoft.com/office/drawing/2014/main" id="{2C8F133D-8022-B3B7-7B8A-848A7BAB096E}"/>
+              </a:ext>
+            </a:extLst>
+          </p:cNvPr>
+          <p:cNvSpPr>
+            <a:spLocks noGrp="1"/>
+          </p:cNvSpPr>
+          <p:nvPr>
+            <p:ph type="title"/>
+          </p:nvPr>
+        </p:nvSpPr>
+        <p:spPr/>
+        <p:txBody>
+          <a:bodyPr/>
+          <a:lstStyle/>
+          <a:p>
+            <a:r>
+              <a:rPr lang="es-ES" dirty="0"/>
+              <a:t>INTERPRETACION</a:t>
+            </a:r>
+            <a:endParaRPr lang="es-PE" dirty="0"/>
+          </a:p>
+        </p:txBody>
+      </p:sp>
+      <p:sp>
+        <p:nvSpPr>
+          <p:cNvPr id="3" name="Marcador de contenido 2">
+            <a:extLst>
+              <a:ext uri="{FF2B5EF4-FFF2-40B4-BE49-F238E27FC236}">
+                <a16:creationId xmlns:a16="http://schemas.microsoft.com/office/drawing/2014/main" id="{F407C8F7-3CC9-B5B8-EE80-D4F93EC070E7}"/>
+              </a:ext>
+            </a:extLst>
+          </p:cNvPr>
+          <p:cNvSpPr>
+            <a:spLocks noGrp="1"/>
+          </p:cNvSpPr>
+          <p:nvPr>
+            <p:ph sz="quarter" idx="13"/>
+          </p:nvPr>
+        </p:nvSpPr>
+        <p:spPr/>
+        <p:txBody>
+          <a:bodyPr>
+            <a:normAutofit lnSpcReduction="10000"/>
+          </a:bodyPr>
+          <a:lstStyle/>
+          <a:p>
+            <a:r>
+              <a:rPr lang="es-PE" dirty="0"/>
+              <a:t>¿Qué queremos saber ahora? Que tipos de incidentes, los horarios y en que zonas ocurrieron los delitos</a:t>
+            </a:r>
+          </a:p>
+          <a:p>
+            <a:r>
+              <a:rPr lang="es-PE" dirty="0"/>
+              <a:t>¿Qué hipótesis ocurren? Si hay muchos robos en calles sin luz ¿habría que mejorar el alumbrado?</a:t>
+            </a:r>
+          </a:p>
+          <a:p>
+            <a:r>
+              <a:rPr lang="es-PE" dirty="0"/>
+              <a:t>¿Qué debemos hacer? Mejorar la iluminación en las zonas rojas e implementar visión por computadora (</a:t>
+            </a:r>
+            <a:r>
+              <a:rPr lang="es-PE" dirty="0" err="1"/>
+              <a:t>motion</a:t>
+            </a:r>
+            <a:r>
+              <a:rPr lang="es-PE" dirty="0"/>
+              <a:t> </a:t>
+            </a:r>
+            <a:r>
+              <a:rPr lang="es-PE" dirty="0" err="1"/>
+              <a:t>detection</a:t>
+            </a:r>
+            <a:r>
+              <a:rPr lang="es-PE" dirty="0"/>
+              <a:t>) e </a:t>
+            </a:r>
+            <a:r>
+              <a:rPr lang="es-PE" dirty="0" err="1"/>
+              <a:t>ia</a:t>
+            </a:r>
+            <a:r>
+              <a:rPr lang="es-PE" dirty="0"/>
+              <a:t> en las cámaras de seguridad.</a:t>
+            </a:r>
+          </a:p>
+          <a:p>
+            <a:r>
+              <a:rPr lang="es-PE" dirty="0"/>
+              <a:t>¿Qué otros datos necesitamos?: datos demográficos, socioeconómicos o eventos que ocurrieron los días con mas delitos</a:t>
+            </a:r>
+          </a:p>
+          <a:p>
+            <a:endParaRPr lang="es-PE" dirty="0"/>
+          </a:p>
+        </p:txBody>
+      </p:sp>
+    </p:spTree>
+    <p:extLst>
+      <p:ext uri="{BB962C8B-B14F-4D97-AF65-F5344CB8AC3E}">
+        <p14:creationId xmlns:p14="http://schemas.microsoft.com/office/powerpoint/2010/main" val="1451370046"/>
+      </p:ext>
+    </p:extLst>
+  </p:cSld>
+  <p:clrMapOvr>
+    <a:masterClrMapping/>
+  </p:clrMapOvr>
+</p:sld>
+</file>
+
+<file path=ppt/slides/slide11.xml><?xml version="1.0" encoding="utf-8"?>
+<p:sld xmlns:a="http://schemas.openxmlformats.org/drawingml/2006/main" xmlns:r="http://schemas.openxmlformats.org/officeDocument/2006/relationships" xmlns:p="http://schemas.openxmlformats.org/presentationml/2006/main">
+  <p:cSld>
+    <p:spTree>
+      <p:nvGrpSpPr>
+        <p:cNvPr id="1" name=""/>
+        <p:cNvGrpSpPr/>
+        <p:nvPr/>
+      </p:nvGrpSpPr>
+      <p:grpSpPr>
+        <a:xfrm>
+          <a:off x="0" y="0"/>
+          <a:ext cx="0" cy="0"/>
+          <a:chOff x="0" y="0"/>
+          <a:chExt cx="0" cy="0"/>
+        </a:xfrm>
+      </p:grpSpPr>
+      <p:sp>
+        <p:nvSpPr>
+          <p:cNvPr id="2" name="Título 1"/>
+          <p:cNvSpPr>
+            <a:spLocks noGrp="1"/>
+          </p:cNvSpPr>
+          <p:nvPr>
+            <p:ph type="title"/>
+          </p:nvPr>
+        </p:nvSpPr>
+        <p:spPr>
+          <a:xfrm>
+            <a:off x="654867" y="1781269"/>
+            <a:ext cx="10396882" cy="1764062"/>
+          </a:xfrm>
+        </p:spPr>
+        <p:txBody>
+          <a:bodyPr>
+            <a:noAutofit/>
+          </a:bodyPr>
+          <a:lstStyle/>
+          <a:p>
+            <a:pPr algn="ctr"/>
+            <a:r>
+              <a:rPr lang="es-MX" sz="9600" dirty="0"/>
+              <a:t>fin</a:t>
+            </a:r>
+            <a:endParaRPr lang="es-PE" sz="9600" dirty="0"/>
+          </a:p>
+        </p:txBody>
+      </p:sp>
+    </p:spTree>
+    <p:extLst>
+      <p:ext uri="{BB962C8B-B14F-4D97-AF65-F5344CB8AC3E}">
+        <p14:creationId xmlns:p14="http://schemas.microsoft.com/office/powerpoint/2010/main" val="582627276"/>
+      </p:ext>
+    </p:extLst>
+  </p:cSld>
+  <p:clrMapOvr>
+    <a:masterClrMapping/>
+  </p:clrMapOvr>
+</p:sld>
+</file>
+
 <file path=ppt/slides/slide2.xml><?xml version="1.0" encoding="utf-8"?>
 <p:sld xmlns:a="http://schemas.openxmlformats.org/drawingml/2006/main" xmlns:r="http://schemas.openxmlformats.org/officeDocument/2006/relationships" xmlns:p="http://schemas.openxmlformats.org/presentationml/2006/main">
   <p:cSld>
@@ -6315,7 +6515,7 @@
           <a:lstStyle/>
           <a:p>
             <a:r>
-              <a:rPr lang="es-MX" dirty="0" smtClean="0"/>
+              <a:rPr lang="es-MX" dirty="0"/>
               <a:t>ARQUITECTURA CAPA DE INGESTA</a:t>
             </a:r>
             <a:endParaRPr lang="es-PE" dirty="0"/>
@@ -6345,66 +6545,45 @@
           <a:lstStyle/>
           <a:p>
             <a:r>
-              <a:rPr lang="es-MX" dirty="0" smtClean="0"/>
+              <a:rPr lang="es-MX" dirty="0"/>
               <a:t>Capturaremos datos desde diversas fuentes</a:t>
             </a:r>
           </a:p>
           <a:p>
             <a:pPr lvl="1"/>
             <a:r>
-              <a:rPr lang="es-MX" dirty="0" smtClean="0"/>
-              <a:t>Cámaras de videovigilancia</a:t>
-            </a:r>
-            <a:r>
               <a:rPr lang="es-MX" dirty="0"/>
-              <a:t> </a:t>
-            </a:r>
-            <a:endParaRPr lang="es-MX" dirty="0" smtClean="0"/>
+              <a:t>Cámaras de videovigilancia </a:t>
+            </a:r>
           </a:p>
           <a:p>
             <a:pPr lvl="1"/>
             <a:r>
-              <a:rPr lang="es-MX" dirty="0" smtClean="0"/>
+              <a:rPr lang="es-MX" dirty="0"/>
               <a:t>Sensores iot de audio</a:t>
             </a:r>
           </a:p>
           <a:p>
             <a:pPr lvl="1"/>
             <a:r>
-              <a:rPr lang="es-MX" dirty="0" smtClean="0"/>
+              <a:rPr lang="es-MX" dirty="0"/>
               <a:t>reportes en redes sociales</a:t>
             </a:r>
           </a:p>
           <a:p>
             <a:r>
-              <a:rPr lang="es-MX" dirty="0" smtClean="0"/>
-              <a:t>Usaremos </a:t>
-            </a:r>
-            <a:r>
-              <a:rPr lang="es-MX" dirty="0" smtClean="0"/>
-              <a:t>apache Kafka  como tecnología en nuestro </a:t>
-            </a:r>
-            <a:r>
-              <a:rPr lang="es-MX" dirty="0" smtClean="0"/>
-              <a:t>CASO</a:t>
-            </a:r>
-          </a:p>
-          <a:p>
-            <a:r>
-              <a:rPr lang="es-MX" dirty="0" smtClean="0"/>
-              <a:t>MENOR </a:t>
-            </a:r>
-            <a:r>
-              <a:rPr lang="es-MX" dirty="0" smtClean="0"/>
-              <a:t>FLEXIVILIDAD PARAR OTROS </a:t>
-            </a:r>
-            <a:r>
-              <a:rPr lang="es-MX" dirty="0" smtClean="0"/>
-              <a:t>ENTORNOS</a:t>
-            </a:r>
-          </a:p>
-          <a:p>
-            <a:endParaRPr lang="es-MX" dirty="0" smtClean="0"/>
+              <a:rPr lang="es-MX" dirty="0"/>
+              <a:t>Usaremos apache Kafka  como tecnología en nuestro CASO</a:t>
+            </a:r>
+          </a:p>
+          <a:p>
+            <a:r>
+              <a:rPr lang="es-MX" dirty="0"/>
+              <a:t>MENOR FLEXIVILIDAD PARAR OTROS ENTORNOS</a:t>
+            </a:r>
+          </a:p>
+          <a:p>
+            <a:endParaRPr lang="es-MX" dirty="0"/>
           </a:p>
         </p:txBody>
       </p:sp>
@@ -8569,11 +8748,11 @@
           <a:lstStyle/>
           <a:p>
             <a:r>
-              <a:rPr lang="es-MX" dirty="0" smtClean="0"/>
+              <a:rPr lang="es-MX" dirty="0"/>
               <a:t>Sistema </a:t>
             </a:r>
             <a:r>
-              <a:rPr lang="es-MX" dirty="0" err="1" smtClean="0"/>
+              <a:rPr lang="es-MX" dirty="0" err="1"/>
               <a:t>hdfs</a:t>
             </a:r>
             <a:endParaRPr lang="es-PE" dirty="0"/>
@@ -8603,62 +8782,31 @@
           <a:lstStyle/>
           <a:p>
             <a:r>
-              <a:rPr lang="es-MX" dirty="0" smtClean="0"/>
-              <a:t>Probablemente </a:t>
-            </a:r>
-            <a:r>
               <a:rPr lang="es-MX" dirty="0"/>
-              <a:t>usaremos HDFS ya que en nuestro caso se procesaran videos de cámaras, se consideran medidas de seguridad probablemente duren mas de una hora	</a:t>
-            </a:r>
-            <a:endParaRPr lang="es-MX" dirty="0" smtClean="0"/>
-          </a:p>
-          <a:p>
-            <a:r>
-              <a:rPr lang="es-MX" dirty="0" smtClean="0"/>
+              <a:t>Probablemente usaremos HDFS ya que en nuestro caso se procesaran videos de cámaras, se consideran medidas de seguridad probablemente duren mas de una hora	</a:t>
+            </a:r>
+          </a:p>
+          <a:p>
+            <a:r>
+              <a:rPr lang="es-MX" dirty="0"/>
               <a:t>HDFS ES DE CODIGO ABIERTO, SU USO ES MASIVAMENTE USADO EN PROYECTOS DE BIG DATA</a:t>
             </a:r>
-            <a:endParaRPr lang="es-MX" dirty="0" smtClean="0"/>
-          </a:p>
-          <a:p>
-            <a:r>
-              <a:rPr lang="es-MX" dirty="0" smtClean="0"/>
-              <a:t>ESCALABILIDAD </a:t>
-            </a:r>
-            <a:r>
-              <a:rPr lang="es-MX" dirty="0" smtClean="0"/>
-              <a:t>HORIZONTAL: Esto </a:t>
-            </a:r>
+          </a:p>
+          <a:p>
             <a:r>
               <a:rPr lang="es-MX" dirty="0"/>
-              <a:t>significaría aumentar mas </a:t>
-            </a:r>
-            <a:r>
-              <a:rPr lang="es-MX" dirty="0" smtClean="0"/>
-              <a:t>ESPACIO EN LOS servidores, según SE </a:t>
-            </a:r>
+              <a:t>ESCALABILIDAD HORIZONTAL: Esto significaría aumentar mas ESPACIO EN LOS servidores, según SE vaya necesitando la empresa, UNO ESCOGERIA LOCAL POR ENCIMA DE NUBE POR LA SEGURIDAD</a:t>
+            </a:r>
+          </a:p>
+          <a:p>
             <a:r>
               <a:rPr lang="es-MX" dirty="0"/>
-              <a:t>vaya necesitando la </a:t>
-            </a:r>
-            <a:r>
-              <a:rPr lang="es-MX" dirty="0" smtClean="0"/>
-              <a:t>empresa, UNO ESCOGERIA LOCAL POR ENCIMA DE NUBE POR LA </a:t>
-            </a:r>
-            <a:r>
-              <a:rPr lang="es-MX" dirty="0" smtClean="0"/>
-              <a:t>SEGURIDAD</a:t>
-            </a:r>
-          </a:p>
-          <a:p>
-            <a:r>
-              <a:rPr lang="es-MX" dirty="0" smtClean="0"/>
               <a:t>DATALAKE: GUARDARA TODOS LOS ARCHIVOS EN SUS EXTENCIONES DE ARCHIVO</a:t>
             </a:r>
-            <a:endParaRPr lang="es-MX" dirty="0" smtClean="0"/>
-          </a:p>
-          <a:p>
-            <a:r>
-              <a:rPr lang="es-MX" dirty="0" smtClean="0"/>
+          </a:p>
+          <a:p>
+            <a:r>
+              <a:rPr lang="es-MX" dirty="0"/>
               <a:t>todos los videos en el sistema y luego se enviara a una base de datos.</a:t>
             </a:r>
             <a:endParaRPr lang="es-PE" dirty="0"/>
@@ -8675,13 +8823,6 @@
   <p:clrMapOvr>
     <a:masterClrMapping/>
   </p:clrMapOvr>
-  <p:timing>
-    <p:tnLst>
-      <p:par>
-        <p:cTn id="1" dur="indefinite" restart="never" nodeType="tmRoot"/>
-      </p:par>
-    </p:tnLst>
-  </p:timing>
 </p:sld>
 </file>
 
@@ -8720,19 +8861,19 @@
           <a:lstStyle/>
           <a:p>
             <a:r>
-              <a:rPr lang="es-MX" dirty="0" smtClean="0"/>
+              <a:rPr lang="es-MX" dirty="0"/>
               <a:t>Bases de datos </a:t>
             </a:r>
             <a:r>
-              <a:rPr lang="es-MX" dirty="0" err="1" smtClean="0"/>
+              <a:rPr lang="es-MX" dirty="0" err="1"/>
               <a:t>nosql</a:t>
             </a:r>
             <a:r>
-              <a:rPr lang="es-MX" dirty="0" smtClean="0"/>
+              <a:rPr lang="es-MX" dirty="0"/>
               <a:t> mongo y </a:t>
             </a:r>
             <a:r>
-              <a:rPr lang="es-MX" dirty="0" err="1" smtClean="0"/>
+              <a:rPr lang="es-MX" dirty="0" err="1"/>
               <a:t>redis</a:t>
             </a:r>
             <a:endParaRPr lang="es-PE" dirty="0"/>
@@ -8762,37 +8903,36 @@
           <a:lstStyle/>
           <a:p>
             <a:r>
-              <a:rPr lang="es-MX" dirty="0" smtClean="0"/>
+              <a:rPr lang="es-MX" dirty="0"/>
               <a:t>Mongodb </a:t>
             </a:r>
           </a:p>
           <a:p>
             <a:pPr lvl="1"/>
             <a:r>
-              <a:rPr lang="es-MX" dirty="0" smtClean="0"/>
+              <a:rPr lang="es-MX" dirty="0"/>
               <a:t>Guardar reportes ciudadanos</a:t>
             </a:r>
           </a:p>
           <a:p>
             <a:pPr lvl="1"/>
             <a:r>
-              <a:rPr lang="es-MX" dirty="0" smtClean="0"/>
+              <a:rPr lang="es-MX" dirty="0"/>
               <a:t>Datos de sensores en formato json</a:t>
             </a:r>
           </a:p>
           <a:p>
             <a:r>
-              <a:rPr lang="es-MX" dirty="0" smtClean="0"/>
+              <a:rPr lang="es-MX" dirty="0"/>
               <a:t>Redis</a:t>
             </a:r>
           </a:p>
           <a:p>
             <a:pPr lvl="1"/>
             <a:r>
-              <a:rPr lang="es-MX" dirty="0" smtClean="0"/>
+              <a:rPr lang="es-MX" dirty="0"/>
               <a:t>Velocidad en las alertas a la policia </a:t>
             </a:r>
-            <a:endParaRPr lang="es-MX" dirty="0"/>
           </a:p>
           <a:p>
             <a:r>
@@ -8803,11 +8943,7 @@
           <a:p>
             <a:r>
               <a:rPr lang="es-MX" dirty="0"/>
-              <a:t>Son diseñadas para seguir funcionando aunque falles algunos </a:t>
-            </a:r>
-            <a:r>
-              <a:rPr lang="es-MX" dirty="0" smtClean="0"/>
-              <a:t>nodos</a:t>
+              <a:t>Son diseñadas para seguir funcionando aunque falles algunos nodos</a:t>
             </a:r>
           </a:p>
         </p:txBody>
@@ -8860,23 +8996,19 @@
           <a:lstStyle/>
           <a:p>
             <a:r>
-              <a:rPr lang="es-MX" dirty="0" smtClean="0"/>
+              <a:rPr lang="es-MX" dirty="0"/>
               <a:t>ALMACENAMIENTO google </a:t>
             </a:r>
             <a:r>
-              <a:rPr lang="es-MX" dirty="0" err="1" smtClean="0"/>
+              <a:rPr lang="es-MX" dirty="0" err="1"/>
               <a:t>cloud</a:t>
             </a:r>
             <a:r>
               <a:rPr lang="es-MX" dirty="0"/>
-              <a:t> </a:t>
-            </a:r>
-            <a:r>
-              <a:rPr lang="es-MX" dirty="0" smtClean="0"/>
-              <a:t>y </a:t>
-            </a:r>
-            <a:r>
-              <a:rPr lang="es-MX" dirty="0" err="1" smtClean="0"/>
+              <a:t> y </a:t>
+            </a:r>
+            <a:r>
+              <a:rPr lang="es-MX" dirty="0" err="1"/>
               <a:t>azure</a:t>
             </a:r>
             <a:endParaRPr lang="es-PE" dirty="0"/>
@@ -8908,58 +9040,51 @@
             </a:r>
             <a:r>
               <a:rPr lang="es-MX" dirty="0"/>
-              <a:t> de videos sin preocuparse por el </a:t>
-            </a:r>
-            <a:r>
-              <a:rPr lang="es-MX" dirty="0" smtClean="0"/>
-              <a:t>limite</a:t>
-            </a:r>
-          </a:p>
-          <a:p>
-            <a:r>
-              <a:rPr lang="es-MX" dirty="0" smtClean="0"/>
+              <a:t> de videos sin preocuparse por el limite</a:t>
+            </a:r>
+          </a:p>
+          <a:p>
+            <a:r>
+              <a:rPr lang="es-MX" dirty="0"/>
               <a:t>En la nube por su seguridad y precio en nuestro caso lo ideal</a:t>
             </a:r>
-            <a:endParaRPr lang="es-MX" dirty="0" smtClean="0"/>
-          </a:p>
-          <a:p>
-            <a:r>
-              <a:rPr lang="es-MX" dirty="0" smtClean="0"/>
+          </a:p>
+          <a:p>
+            <a:r>
+              <a:rPr lang="es-MX" dirty="0"/>
               <a:t>Metadatos en los videos queden grabados para </a:t>
             </a:r>
             <a:r>
-              <a:rPr lang="es-MX" dirty="0" err="1" smtClean="0"/>
+              <a:rPr lang="es-MX" dirty="0" err="1"/>
               <a:t>forence</a:t>
             </a:r>
             <a:r>
-              <a:rPr lang="es-MX" dirty="0" smtClean="0"/>
+              <a:rPr lang="es-MX" dirty="0"/>
               <a:t> y su investigación.</a:t>
             </a:r>
+          </a:p>
+          <a:p>
+            <a:r>
+              <a:rPr lang="es-MX" dirty="0"/>
+              <a:t>Usaremos bases de dato no relacionales para contener el tipo de archivo de video</a:t>
+            </a:r>
+          </a:p>
+          <a:p>
+            <a:r>
+              <a:rPr lang="es-MX" dirty="0"/>
+              <a:t>Almacenado y antes de que el </a:t>
+            </a:r>
+            <a:r>
+              <a:rPr lang="es-MX" dirty="0" err="1"/>
+              <a:t>preprocesamiento</a:t>
+            </a:r>
+            <a:r>
+              <a:rPr lang="es-MX" dirty="0"/>
+              <a:t> este como opción </a:t>
+            </a:r>
+          </a:p>
+          <a:p>
             <a:endParaRPr lang="es-MX" dirty="0"/>
-          </a:p>
-          <a:p>
-            <a:r>
-              <a:rPr lang="es-MX" dirty="0" smtClean="0"/>
-              <a:t>Usaremos bases de dato no relacionales para contener el tipo de archivo de video</a:t>
-            </a:r>
-          </a:p>
-          <a:p>
-            <a:r>
-              <a:rPr lang="es-MX" dirty="0" smtClean="0"/>
-              <a:t>Almacenado y antes de que el </a:t>
-            </a:r>
-            <a:r>
-              <a:rPr lang="es-MX" dirty="0" err="1" smtClean="0"/>
-              <a:t>preprocesamiento</a:t>
-            </a:r>
-            <a:r>
-              <a:rPr lang="es-MX" dirty="0" smtClean="0"/>
-              <a:t> este como opción </a:t>
-            </a:r>
-            <a:endParaRPr lang="es-MX" dirty="0" smtClean="0"/>
-          </a:p>
-          <a:p>
-            <a:endParaRPr lang="es-MX" dirty="0" smtClean="0"/>
           </a:p>
         </p:txBody>
       </p:sp>
@@ -8973,13 +9098,6 @@
   <p:clrMapOvr>
     <a:masterClrMapping/>
   </p:clrMapOvr>
-  <p:timing>
-    <p:tnLst>
-      <p:par>
-        <p:cTn id="1" dur="indefinite" restart="never" nodeType="tmRoot"/>
-      </p:par>
-    </p:tnLst>
-  </p:timing>
 </p:sld>
 </file>
 
@@ -9002,7 +9120,13 @@
       </p:grpSpPr>
       <p:sp>
         <p:nvSpPr>
-          <p:cNvPr id="2" name="Título 1"/>
+          <p:cNvPr id="2" name="Título 1">
+            <a:extLst>
+              <a:ext uri="{FF2B5EF4-FFF2-40B4-BE49-F238E27FC236}">
+                <a16:creationId xmlns:a16="http://schemas.microsoft.com/office/drawing/2014/main" id="{33B7FB96-9FB6-F83B-1FA0-21FE25A48FB4}"/>
+              </a:ext>
+            </a:extLst>
+          </p:cNvPr>
           <p:cNvSpPr>
             <a:spLocks noGrp="1"/>
           </p:cNvSpPr>
@@ -9010,44 +9134,452 @@
             <p:ph type="title"/>
           </p:nvPr>
         </p:nvSpPr>
-        <p:spPr>
-          <a:xfrm>
-            <a:off x="654867" y="1781269"/>
-            <a:ext cx="10396882" cy="1764062"/>
-          </a:xfrm>
-        </p:spPr>
-        <p:txBody>
-          <a:bodyPr>
-            <a:noAutofit/>
-          </a:bodyPr>
+        <p:spPr/>
+        <p:txBody>
+          <a:bodyPr/>
           <a:lstStyle/>
           <a:p>
-            <a:pPr algn="ctr"/>
-            <a:r>
-              <a:rPr lang="es-MX" sz="9600" dirty="0" smtClean="0"/>
-              <a:t>fin</a:t>
-            </a:r>
-            <a:endParaRPr lang="es-PE" sz="9600" dirty="0"/>
+            <a:r>
+              <a:rPr lang="es-ES" dirty="0"/>
+              <a:t>PROCESAMIENTO de datos</a:t>
+            </a:r>
+            <a:endParaRPr lang="es-PE" dirty="0"/>
+          </a:p>
+        </p:txBody>
+      </p:sp>
+      <p:sp>
+        <p:nvSpPr>
+          <p:cNvPr id="3" name="Marcador de contenido 2">
+            <a:extLst>
+              <a:ext uri="{FF2B5EF4-FFF2-40B4-BE49-F238E27FC236}">
+                <a16:creationId xmlns:a16="http://schemas.microsoft.com/office/drawing/2014/main" id="{EE92C5D9-45E6-2694-1460-0D43938C311B}"/>
+              </a:ext>
+            </a:extLst>
+          </p:cNvPr>
+          <p:cNvSpPr>
+            <a:spLocks noGrp="1"/>
+          </p:cNvSpPr>
+          <p:nvPr>
+            <p:ph sz="quarter" idx="13"/>
+          </p:nvPr>
+        </p:nvSpPr>
+        <p:spPr/>
+        <p:txBody>
+          <a:bodyPr/>
+          <a:lstStyle/>
+          <a:p>
+            <a:r>
+              <a:rPr lang="es-ES" dirty="0"/>
+              <a:t>Clasificar datos por videos, audios, texto, etc para facilitar su procesamiento</a:t>
+            </a:r>
+          </a:p>
+          <a:p>
+            <a:r>
+              <a:rPr lang="es-ES" dirty="0"/>
+              <a:t>Limpieza de datos eliminar archivos corruptos, incompletos, reportes falsos, spam</a:t>
+            </a:r>
+          </a:p>
+          <a:p>
+            <a:r>
+              <a:rPr lang="es-ES" dirty="0"/>
+              <a:t>Operaciones matemáticas con los datos para estandarizarlos y normalizarlos a binario</a:t>
+            </a:r>
+          </a:p>
+          <a:p>
+            <a:r>
+              <a:rPr lang="es-ES" dirty="0"/>
+              <a:t>Comprensión de archivos por ejemplo de .mp4 a h.264/65 en un mismo formato</a:t>
+            </a:r>
+          </a:p>
+          <a:p>
+            <a:endParaRPr lang="es-ES" dirty="0"/>
           </a:p>
         </p:txBody>
       </p:sp>
     </p:spTree>
     <p:extLst>
       <p:ext uri="{BB962C8B-B14F-4D97-AF65-F5344CB8AC3E}">
-        <p14:creationId xmlns:p14="http://schemas.microsoft.com/office/powerpoint/2010/main" val="582627276"/>
+        <p14:creationId xmlns:p14="http://schemas.microsoft.com/office/powerpoint/2010/main" val="2883057395"/>
       </p:ext>
     </p:extLst>
   </p:cSld>
   <p:clrMapOvr>
     <a:masterClrMapping/>
   </p:clrMapOvr>
-  <p:timing>
-    <p:tnLst>
-      <p:par>
-        <p:cTn id="1" dur="indefinite" restart="never" nodeType="tmRoot"/>
-      </p:par>
-    </p:tnLst>
-  </p:timing>
+</p:sld>
+</file>
+
+<file path=ppt/slides/slide7.xml><?xml version="1.0" encoding="utf-8"?>
+<p:sld xmlns:a="http://schemas.openxmlformats.org/drawingml/2006/main" xmlns:r="http://schemas.openxmlformats.org/officeDocument/2006/relationships" xmlns:p="http://schemas.openxmlformats.org/presentationml/2006/main">
+  <p:cSld>
+    <p:spTree>
+      <p:nvGrpSpPr>
+        <p:cNvPr id="1" name=""/>
+        <p:cNvGrpSpPr/>
+        <p:nvPr/>
+      </p:nvGrpSpPr>
+      <p:grpSpPr>
+        <a:xfrm>
+          <a:off x="0" y="0"/>
+          <a:ext cx="0" cy="0"/>
+          <a:chOff x="0" y="0"/>
+          <a:chExt cx="0" cy="0"/>
+        </a:xfrm>
+      </p:grpSpPr>
+      <p:sp>
+        <p:nvSpPr>
+          <p:cNvPr id="2" name="Título 1">
+            <a:extLst>
+              <a:ext uri="{FF2B5EF4-FFF2-40B4-BE49-F238E27FC236}">
+                <a16:creationId xmlns:a16="http://schemas.microsoft.com/office/drawing/2014/main" id="{68927E10-52B0-13D5-3C01-108D73555C84}"/>
+              </a:ext>
+            </a:extLst>
+          </p:cNvPr>
+          <p:cNvSpPr>
+            <a:spLocks noGrp="1"/>
+          </p:cNvSpPr>
+          <p:nvPr>
+            <p:ph type="title"/>
+          </p:nvPr>
+        </p:nvSpPr>
+        <p:spPr/>
+        <p:txBody>
+          <a:bodyPr/>
+          <a:lstStyle/>
+          <a:p>
+            <a:r>
+              <a:rPr lang="es-ES" dirty="0" err="1"/>
+              <a:t>Analisis</a:t>
+            </a:r>
+            <a:r>
+              <a:rPr lang="es-ES" dirty="0"/>
+              <a:t> de datos</a:t>
+            </a:r>
+            <a:endParaRPr lang="es-PE" dirty="0"/>
+          </a:p>
+        </p:txBody>
+      </p:sp>
+      <p:sp>
+        <p:nvSpPr>
+          <p:cNvPr id="3" name="Marcador de contenido 2">
+            <a:extLst>
+              <a:ext uri="{FF2B5EF4-FFF2-40B4-BE49-F238E27FC236}">
+                <a16:creationId xmlns:a16="http://schemas.microsoft.com/office/drawing/2014/main" id="{F0C71FBA-4C88-9D0A-7C56-5DAA737F9ACC}"/>
+              </a:ext>
+            </a:extLst>
+          </p:cNvPr>
+          <p:cNvSpPr>
+            <a:spLocks noGrp="1"/>
+          </p:cNvSpPr>
+          <p:nvPr>
+            <p:ph sz="quarter" idx="13"/>
+          </p:nvPr>
+        </p:nvSpPr>
+        <p:spPr/>
+        <p:txBody>
+          <a:bodyPr/>
+          <a:lstStyle/>
+          <a:p>
+            <a:r>
+              <a:rPr lang="es-ES" dirty="0"/>
+              <a:t>Estadística: calcular frecuencia de delitos por zona, hora y tipo de incidente.</a:t>
+            </a:r>
+          </a:p>
+          <a:p>
+            <a:r>
+              <a:rPr lang="es-ES" dirty="0"/>
+              <a:t>Comparativa: actuales con lo histórico para saber su aumento o disminuyo</a:t>
+            </a:r>
+          </a:p>
+          <a:p>
+            <a:r>
+              <a:rPr lang="es-ES" dirty="0"/>
+              <a:t>Machine learning: entrenar modelos para predecir cuando puede ocurrir un delito</a:t>
+            </a:r>
+          </a:p>
+          <a:p>
+            <a:r>
+              <a:rPr lang="es-ES" dirty="0"/>
+              <a:t>Inteligencia artificial </a:t>
+            </a:r>
+            <a:r>
+              <a:rPr lang="es-PE" dirty="0"/>
+              <a:t>(visión por computadora)</a:t>
+            </a:r>
+            <a:r>
+              <a:rPr lang="es-ES" dirty="0"/>
+              <a:t>: analizar videos y audios para reconocer rostros, armas, disparos o comportamientos sospechosos.</a:t>
+            </a:r>
+          </a:p>
+          <a:p>
+            <a:endParaRPr lang="es-PE" dirty="0"/>
+          </a:p>
+        </p:txBody>
+      </p:sp>
+    </p:spTree>
+    <p:extLst>
+      <p:ext uri="{BB962C8B-B14F-4D97-AF65-F5344CB8AC3E}">
+        <p14:creationId xmlns:p14="http://schemas.microsoft.com/office/powerpoint/2010/main" val="3705263111"/>
+      </p:ext>
+    </p:extLst>
+  </p:cSld>
+  <p:clrMapOvr>
+    <a:masterClrMapping/>
+  </p:clrMapOvr>
+</p:sld>
+</file>
+
+<file path=ppt/slides/slide8.xml><?xml version="1.0" encoding="utf-8"?>
+<p:sld xmlns:a="http://schemas.openxmlformats.org/drawingml/2006/main" xmlns:r="http://schemas.openxmlformats.org/officeDocument/2006/relationships" xmlns:p="http://schemas.openxmlformats.org/presentationml/2006/main">
+  <p:cSld>
+    <p:spTree>
+      <p:nvGrpSpPr>
+        <p:cNvPr id="1" name=""/>
+        <p:cNvGrpSpPr/>
+        <p:nvPr/>
+      </p:nvGrpSpPr>
+      <p:grpSpPr>
+        <a:xfrm>
+          <a:off x="0" y="0"/>
+          <a:ext cx="0" cy="0"/>
+          <a:chOff x="0" y="0"/>
+          <a:chExt cx="0" cy="0"/>
+        </a:xfrm>
+      </p:grpSpPr>
+      <p:sp>
+        <p:nvSpPr>
+          <p:cNvPr id="2" name="Título 1">
+            <a:extLst>
+              <a:ext uri="{FF2B5EF4-FFF2-40B4-BE49-F238E27FC236}">
+                <a16:creationId xmlns:a16="http://schemas.microsoft.com/office/drawing/2014/main" id="{2A89E660-032B-352A-5770-AC1B9110EA79}"/>
+              </a:ext>
+            </a:extLst>
+          </p:cNvPr>
+          <p:cNvSpPr>
+            <a:spLocks noGrp="1"/>
+          </p:cNvSpPr>
+          <p:nvPr>
+            <p:ph type="title"/>
+          </p:nvPr>
+        </p:nvSpPr>
+        <p:spPr/>
+        <p:txBody>
+          <a:bodyPr/>
+          <a:lstStyle/>
+          <a:p>
+            <a:r>
+              <a:rPr lang="es-ES" dirty="0"/>
+              <a:t>GESTION de datos</a:t>
+            </a:r>
+            <a:endParaRPr lang="es-PE" dirty="0"/>
+          </a:p>
+        </p:txBody>
+      </p:sp>
+      <p:sp>
+        <p:nvSpPr>
+          <p:cNvPr id="3" name="Marcador de contenido 2">
+            <a:extLst>
+              <a:ext uri="{FF2B5EF4-FFF2-40B4-BE49-F238E27FC236}">
+                <a16:creationId xmlns:a16="http://schemas.microsoft.com/office/drawing/2014/main" id="{4745657D-A5E3-B6D7-C4CA-AEB97B5FEF23}"/>
+              </a:ext>
+            </a:extLst>
+          </p:cNvPr>
+          <p:cNvSpPr>
+            <a:spLocks noGrp="1"/>
+          </p:cNvSpPr>
+          <p:nvPr>
+            <p:ph sz="quarter" idx="13"/>
+          </p:nvPr>
+        </p:nvSpPr>
+        <p:spPr/>
+        <p:txBody>
+          <a:bodyPr/>
+          <a:lstStyle/>
+          <a:p>
+            <a:r>
+              <a:rPr lang="es-ES" dirty="0"/>
+              <a:t>Organizar los datos </a:t>
+            </a:r>
+            <a:r>
+              <a:rPr lang="es-ES" dirty="0" err="1"/>
+              <a:t>json</a:t>
+            </a:r>
+            <a:r>
+              <a:rPr lang="es-ES" dirty="0"/>
+              <a:t> y sus metadatos de los archivos para facilitar la </a:t>
+            </a:r>
+            <a:r>
+              <a:rPr lang="es-ES" dirty="0" err="1"/>
+              <a:t>gestion</a:t>
+            </a:r>
+            <a:r>
+              <a:rPr lang="es-ES" dirty="0"/>
+              <a:t> en bases de dato </a:t>
+            </a:r>
+            <a:r>
+              <a:rPr lang="es-ES" dirty="0" err="1"/>
+              <a:t>nosql</a:t>
+            </a:r>
+            <a:r>
+              <a:rPr lang="es-ES" dirty="0"/>
+              <a:t> agregar descripción en un lenguaje que entienda la maquina (binario) </a:t>
+            </a:r>
+          </a:p>
+          <a:p>
+            <a:r>
+              <a:rPr lang="es-ES" dirty="0"/>
+              <a:t>Aplicar técnicas de encriptación en los datos </a:t>
+            </a:r>
+            <a:r>
+              <a:rPr lang="es-ES" dirty="0" err="1"/>
+              <a:t>tls</a:t>
+            </a:r>
+            <a:r>
+              <a:rPr lang="es-ES" dirty="0"/>
+              <a:t> y aes-256 para la seguridad en los datos</a:t>
+            </a:r>
+          </a:p>
+          <a:p>
+            <a:r>
+              <a:rPr lang="es-ES" dirty="0"/>
+              <a:t>Definir tiempo de vida de los datos y automatizarlo para optimizar costos  </a:t>
+            </a:r>
+            <a:endParaRPr lang="es-PE" dirty="0"/>
+          </a:p>
+        </p:txBody>
+      </p:sp>
+    </p:spTree>
+    <p:extLst>
+      <p:ext uri="{BB962C8B-B14F-4D97-AF65-F5344CB8AC3E}">
+        <p14:creationId xmlns:p14="http://schemas.microsoft.com/office/powerpoint/2010/main" val="3834791493"/>
+      </p:ext>
+    </p:extLst>
+  </p:cSld>
+  <p:clrMapOvr>
+    <a:masterClrMapping/>
+  </p:clrMapOvr>
+</p:sld>
+</file>
+
+<file path=ppt/slides/slide9.xml><?xml version="1.0" encoding="utf-8"?>
+<p:sld xmlns:a="http://schemas.openxmlformats.org/drawingml/2006/main" xmlns:r="http://schemas.openxmlformats.org/officeDocument/2006/relationships" xmlns:p="http://schemas.openxmlformats.org/presentationml/2006/main">
+  <p:cSld>
+    <p:spTree>
+      <p:nvGrpSpPr>
+        <p:cNvPr id="1" name=""/>
+        <p:cNvGrpSpPr/>
+        <p:nvPr/>
+      </p:nvGrpSpPr>
+      <p:grpSpPr>
+        <a:xfrm>
+          <a:off x="0" y="0"/>
+          <a:ext cx="0" cy="0"/>
+          <a:chOff x="0" y="0"/>
+          <a:chExt cx="0" cy="0"/>
+        </a:xfrm>
+      </p:grpSpPr>
+      <p:sp>
+        <p:nvSpPr>
+          <p:cNvPr id="2" name="Título 1">
+            <a:extLst>
+              <a:ext uri="{FF2B5EF4-FFF2-40B4-BE49-F238E27FC236}">
+                <a16:creationId xmlns:a16="http://schemas.microsoft.com/office/drawing/2014/main" id="{685568E4-8CFE-83EC-362D-292861C807E1}"/>
+              </a:ext>
+            </a:extLst>
+          </p:cNvPr>
+          <p:cNvSpPr>
+            <a:spLocks noGrp="1"/>
+          </p:cNvSpPr>
+          <p:nvPr>
+            <p:ph type="title"/>
+          </p:nvPr>
+        </p:nvSpPr>
+        <p:spPr/>
+        <p:txBody>
+          <a:bodyPr/>
+          <a:lstStyle/>
+          <a:p>
+            <a:r>
+              <a:rPr lang="es-ES" dirty="0"/>
+              <a:t>VISUALIZACION de datos</a:t>
+            </a:r>
+            <a:endParaRPr lang="es-PE" dirty="0"/>
+          </a:p>
+        </p:txBody>
+      </p:sp>
+      <p:sp>
+        <p:nvSpPr>
+          <p:cNvPr id="3" name="Marcador de contenido 2">
+            <a:extLst>
+              <a:ext uri="{FF2B5EF4-FFF2-40B4-BE49-F238E27FC236}">
+                <a16:creationId xmlns:a16="http://schemas.microsoft.com/office/drawing/2014/main" id="{EB9EABF7-8C4E-CE32-A9BC-4F192765EA11}"/>
+              </a:ext>
+            </a:extLst>
+          </p:cNvPr>
+          <p:cNvSpPr>
+            <a:spLocks noGrp="1"/>
+          </p:cNvSpPr>
+          <p:nvPr>
+            <p:ph sz="quarter" idx="13"/>
+          </p:nvPr>
+        </p:nvSpPr>
+        <p:spPr/>
+        <p:txBody>
+          <a:bodyPr/>
+          <a:lstStyle/>
+          <a:p>
+            <a:r>
+              <a:rPr lang="es-ES" dirty="0"/>
+              <a:t>En mi caso es por mapas de calor ubicaremos los incidentes por colores para identificar las zonas con mas delitos rojo son reportes.</a:t>
+            </a:r>
+          </a:p>
+          <a:p>
+            <a:r>
+              <a:rPr lang="es-PE" dirty="0"/>
+              <a:t>Graficar las tendencias de los delitos con </a:t>
+            </a:r>
+            <a:r>
+              <a:rPr lang="es-PE" dirty="0" err="1"/>
+              <a:t>powerbi</a:t>
+            </a:r>
+            <a:r>
+              <a:rPr lang="es-PE" dirty="0"/>
+              <a:t> o </a:t>
+            </a:r>
+            <a:r>
+              <a:rPr lang="es-PE" dirty="0" err="1"/>
+              <a:t>tableu</a:t>
+            </a:r>
+            <a:r>
+              <a:rPr lang="es-PE" dirty="0"/>
+              <a:t> para detectar si aumentan</a:t>
+            </a:r>
+          </a:p>
+          <a:p>
+            <a:r>
+              <a:rPr lang="es-PE" dirty="0" err="1"/>
+              <a:t>Dashboard</a:t>
+            </a:r>
+            <a:r>
+              <a:rPr lang="es-PE" dirty="0"/>
+              <a:t> con los números de incidentes en vivo por ciudad</a:t>
+            </a:r>
+          </a:p>
+          <a:p>
+            <a:endParaRPr lang="es-PE" dirty="0"/>
+          </a:p>
+        </p:txBody>
+      </p:sp>
+    </p:spTree>
+    <p:extLst>
+      <p:ext uri="{BB962C8B-B14F-4D97-AF65-F5344CB8AC3E}">
+        <p14:creationId xmlns:p14="http://schemas.microsoft.com/office/powerpoint/2010/main" val="2833286341"/>
+      </p:ext>
+    </p:extLst>
+  </p:cSld>
+  <p:clrMapOvr>
+    <a:masterClrMapping/>
+  </p:clrMapOvr>
 </p:sld>
 </file>
 

</xml_diff>